<commit_message>
Add Changes in Powerpoint
</commit_message>
<xml_diff>
--- a/documents/projectmanagement/Allgemeines/Guidelines/Entwicklungsrichtlinien.pptx
+++ b/documents/projectmanagement/Allgemeines/Guidelines/Entwicklungsrichtlinien.pptx
@@ -6,11 +6,10 @@
   </p:sldMasterIdLst>
   <p:sldIdLst>
     <p:sldId id="256" r:id="rId2"/>
-    <p:sldId id="257" r:id="rId3"/>
-    <p:sldId id="259" r:id="rId4"/>
-    <p:sldId id="260" r:id="rId5"/>
-    <p:sldId id="261" r:id="rId6"/>
-    <p:sldId id="258" r:id="rId7"/>
+    <p:sldId id="259" r:id="rId3"/>
+    <p:sldId id="260" r:id="rId4"/>
+    <p:sldId id="261" r:id="rId5"/>
+    <p:sldId id="258" r:id="rId6"/>
   </p:sldIdLst>
   <p:sldSz cx="12192000" cy="6858000"/>
   <p:notesSz cx="6858000" cy="9144000"/>
@@ -109,6 +108,11 @@
       </a:defRPr>
     </a:lvl9pPr>
   </p:defaultTextStyle>
+  <p:extLst>
+    <p:ext uri="{EFAFB233-063F-42B5-8137-9DF3F51BA10A}">
+      <p15:sldGuideLst xmlns:p15="http://schemas.microsoft.com/office/powerpoint/2012/main"/>
+    </p:ext>
+  </p:extLst>
 </p:presentation>
 </file>
 
@@ -157,7 +161,6 @@
               <a:rPr lang="de-DE"/>
               <a:t>Titelmasterformat durch Klicken bearbeiten</a:t>
             </a:r>
-            <a:endParaRPr lang="de-DE"/>
           </a:p>
         </p:txBody>
       </p:sp>
@@ -222,7 +225,6 @@
               <a:rPr lang="de-DE"/>
               <a:t>Formatvorlage des Untertitelmasters durch Klicken bearbeiten</a:t>
             </a:r>
-            <a:endParaRPr lang="de-DE"/>
           </a:p>
         </p:txBody>
       </p:sp>
@@ -243,7 +245,7 @@
           <a:p>
             <a:fld id="{CA8599B3-1775-458B-834E-5BA6D9E81E99}" type="datetimeFigureOut">
               <a:rPr lang="de-DE" smtClean="0"/>
-              <a:t>23.07.2016</a:t>
+              <a:t>26.07.2016</a:t>
             </a:fld>
             <a:endParaRPr lang="de-DE"/>
           </a:p>
@@ -340,7 +342,6 @@
               <a:rPr lang="de-DE"/>
               <a:t>Titelmasterformat durch Klicken bearbeiten</a:t>
             </a:r>
-            <a:endParaRPr lang="de-DE"/>
           </a:p>
         </p:txBody>
       </p:sp>
@@ -392,7 +393,6 @@
               <a:rPr lang="de-DE"/>
               <a:t>Fünfte Ebene</a:t>
             </a:r>
-            <a:endParaRPr lang="de-DE"/>
           </a:p>
         </p:txBody>
       </p:sp>
@@ -413,7 +413,7 @@
           <a:p>
             <a:fld id="{CA8599B3-1775-458B-834E-5BA6D9E81E99}" type="datetimeFigureOut">
               <a:rPr lang="de-DE" smtClean="0"/>
-              <a:t>23.07.2016</a:t>
+              <a:t>26.07.2016</a:t>
             </a:fld>
             <a:endParaRPr lang="de-DE"/>
           </a:p>
@@ -515,7 +515,6 @@
               <a:rPr lang="de-DE"/>
               <a:t>Titelmasterformat durch Klicken bearbeiten</a:t>
             </a:r>
-            <a:endParaRPr lang="de-DE"/>
           </a:p>
         </p:txBody>
       </p:sp>
@@ -572,7 +571,6 @@
               <a:rPr lang="de-DE"/>
               <a:t>Fünfte Ebene</a:t>
             </a:r>
-            <a:endParaRPr lang="de-DE"/>
           </a:p>
         </p:txBody>
       </p:sp>
@@ -593,7 +591,7 @@
           <a:p>
             <a:fld id="{CA8599B3-1775-458B-834E-5BA6D9E81E99}" type="datetimeFigureOut">
               <a:rPr lang="de-DE" smtClean="0"/>
-              <a:t>23.07.2016</a:t>
+              <a:t>26.07.2016</a:t>
             </a:fld>
             <a:endParaRPr lang="de-DE"/>
           </a:p>
@@ -690,7 +688,6 @@
               <a:rPr lang="de-DE"/>
               <a:t>Titelmasterformat durch Klicken bearbeiten</a:t>
             </a:r>
-            <a:endParaRPr lang="de-DE"/>
           </a:p>
         </p:txBody>
       </p:sp>
@@ -742,7 +739,6 @@
               <a:rPr lang="de-DE"/>
               <a:t>Fünfte Ebene</a:t>
             </a:r>
-            <a:endParaRPr lang="de-DE"/>
           </a:p>
         </p:txBody>
       </p:sp>
@@ -763,7 +759,7 @@
           <a:p>
             <a:fld id="{CA8599B3-1775-458B-834E-5BA6D9E81E99}" type="datetimeFigureOut">
               <a:rPr lang="de-DE" smtClean="0"/>
-              <a:t>23.07.2016</a:t>
+              <a:t>26.07.2016</a:t>
             </a:fld>
             <a:endParaRPr lang="de-DE"/>
           </a:p>
@@ -869,7 +865,6 @@
               <a:rPr lang="de-DE"/>
               <a:t>Titelmasterformat durch Klicken bearbeiten</a:t>
             </a:r>
-            <a:endParaRPr lang="de-DE"/>
           </a:p>
         </p:txBody>
       </p:sp>
@@ -1009,7 +1004,7 @@
           <a:p>
             <a:fld id="{CA8599B3-1775-458B-834E-5BA6D9E81E99}" type="datetimeFigureOut">
               <a:rPr lang="de-DE" smtClean="0"/>
-              <a:t>23.07.2016</a:t>
+              <a:t>26.07.2016</a:t>
             </a:fld>
             <a:endParaRPr lang="de-DE"/>
           </a:p>
@@ -1106,7 +1101,6 @@
               <a:rPr lang="de-DE"/>
               <a:t>Titelmasterformat durch Klicken bearbeiten</a:t>
             </a:r>
-            <a:endParaRPr lang="de-DE"/>
           </a:p>
         </p:txBody>
       </p:sp>
@@ -1163,7 +1157,6 @@
               <a:rPr lang="de-DE"/>
               <a:t>Fünfte Ebene</a:t>
             </a:r>
-            <a:endParaRPr lang="de-DE"/>
           </a:p>
         </p:txBody>
       </p:sp>
@@ -1220,7 +1213,6 @@
               <a:rPr lang="de-DE"/>
               <a:t>Fünfte Ebene</a:t>
             </a:r>
-            <a:endParaRPr lang="de-DE"/>
           </a:p>
         </p:txBody>
       </p:sp>
@@ -1241,7 +1233,7 @@
           <a:p>
             <a:fld id="{CA8599B3-1775-458B-834E-5BA6D9E81E99}" type="datetimeFigureOut">
               <a:rPr lang="de-DE" smtClean="0"/>
-              <a:t>23.07.2016</a:t>
+              <a:t>26.07.2016</a:t>
             </a:fld>
             <a:endParaRPr lang="de-DE"/>
           </a:p>
@@ -1343,7 +1335,6 @@
               <a:rPr lang="de-DE"/>
               <a:t>Titelmasterformat durch Klicken bearbeiten</a:t>
             </a:r>
-            <a:endParaRPr lang="de-DE"/>
           </a:p>
         </p:txBody>
       </p:sp>
@@ -1465,7 +1456,6 @@
               <a:rPr lang="de-DE"/>
               <a:t>Fünfte Ebene</a:t>
             </a:r>
-            <a:endParaRPr lang="de-DE"/>
           </a:p>
         </p:txBody>
       </p:sp>
@@ -1587,7 +1577,6 @@
               <a:rPr lang="de-DE"/>
               <a:t>Fünfte Ebene</a:t>
             </a:r>
-            <a:endParaRPr lang="de-DE"/>
           </a:p>
         </p:txBody>
       </p:sp>
@@ -1608,7 +1597,7 @@
           <a:p>
             <a:fld id="{CA8599B3-1775-458B-834E-5BA6D9E81E99}" type="datetimeFigureOut">
               <a:rPr lang="de-DE" smtClean="0"/>
-              <a:t>23.07.2016</a:t>
+              <a:t>26.07.2016</a:t>
             </a:fld>
             <a:endParaRPr lang="de-DE"/>
           </a:p>
@@ -1705,7 +1694,6 @@
               <a:rPr lang="de-DE"/>
               <a:t>Titelmasterformat durch Klicken bearbeiten</a:t>
             </a:r>
-            <a:endParaRPr lang="de-DE"/>
           </a:p>
         </p:txBody>
       </p:sp>
@@ -1726,7 +1714,7 @@
           <a:p>
             <a:fld id="{CA8599B3-1775-458B-834E-5BA6D9E81E99}" type="datetimeFigureOut">
               <a:rPr lang="de-DE" smtClean="0"/>
-              <a:t>23.07.2016</a:t>
+              <a:t>26.07.2016</a:t>
             </a:fld>
             <a:endParaRPr lang="de-DE"/>
           </a:p>
@@ -1821,7 +1809,7 @@
           <a:p>
             <a:fld id="{CA8599B3-1775-458B-834E-5BA6D9E81E99}" type="datetimeFigureOut">
               <a:rPr lang="de-DE" smtClean="0"/>
-              <a:t>23.07.2016</a:t>
+              <a:t>26.07.2016</a:t>
             </a:fld>
             <a:endParaRPr lang="de-DE"/>
           </a:p>
@@ -1927,7 +1915,6 @@
               <a:rPr lang="de-DE"/>
               <a:t>Titelmasterformat durch Klicken bearbeiten</a:t>
             </a:r>
-            <a:endParaRPr lang="de-DE"/>
           </a:p>
         </p:txBody>
       </p:sp>
@@ -2012,7 +1999,6 @@
               <a:rPr lang="de-DE"/>
               <a:t>Fünfte Ebene</a:t>
             </a:r>
-            <a:endParaRPr lang="de-DE"/>
           </a:p>
         </p:txBody>
       </p:sp>
@@ -2098,7 +2084,7 @@
           <a:p>
             <a:fld id="{CA8599B3-1775-458B-834E-5BA6D9E81E99}" type="datetimeFigureOut">
               <a:rPr lang="de-DE" smtClean="0"/>
-              <a:t>23.07.2016</a:t>
+              <a:t>26.07.2016</a:t>
             </a:fld>
             <a:endParaRPr lang="de-DE"/>
           </a:p>
@@ -2204,7 +2190,6 @@
               <a:rPr lang="de-DE"/>
               <a:t>Titelmasterformat durch Klicken bearbeiten</a:t>
             </a:r>
-            <a:endParaRPr lang="de-DE"/>
           </a:p>
         </p:txBody>
       </p:sp>
@@ -2351,7 +2336,7 @@
           <a:p>
             <a:fld id="{CA8599B3-1775-458B-834E-5BA6D9E81E99}" type="datetimeFigureOut">
               <a:rPr lang="de-DE" smtClean="0"/>
-              <a:t>23.07.2016</a:t>
+              <a:t>26.07.2016</a:t>
             </a:fld>
             <a:endParaRPr lang="de-DE"/>
           </a:p>
@@ -2463,7 +2448,6 @@
               <a:rPr lang="de-DE"/>
               <a:t>Titelmasterformat durch Klicken bearbeiten</a:t>
             </a:r>
-            <a:endParaRPr lang="de-DE"/>
           </a:p>
         </p:txBody>
       </p:sp>
@@ -2525,7 +2509,6 @@
               <a:rPr lang="de-DE"/>
               <a:t>Fünfte Ebene</a:t>
             </a:r>
-            <a:endParaRPr lang="de-DE"/>
           </a:p>
         </p:txBody>
       </p:sp>
@@ -2564,7 +2547,7 @@
           <a:p>
             <a:fld id="{CA8599B3-1775-458B-834E-5BA6D9E81E99}" type="datetimeFigureOut">
               <a:rPr lang="de-DE" smtClean="0"/>
-              <a:t>23.07.2016</a:t>
+              <a:t>26.07.2016</a:t>
             </a:fld>
             <a:endParaRPr lang="de-DE"/>
           </a:p>
@@ -3125,13 +3108,64 @@
               <a:rPr lang="de-DE" dirty="0"/>
               <a:t>Die Sprache für </a:t>
             </a:r>
+            <a:r>
+              <a:rPr lang="de-DE" b="1" dirty="0"/>
+              <a:t>Kommentare </a:t>
+            </a:r>
+            <a:r>
+              <a:rPr lang="de-DE" dirty="0"/>
+              <a:t>und </a:t>
+            </a:r>
+            <a:r>
+              <a:rPr lang="de-DE" b="1" dirty="0"/>
+              <a:t>Bezeichner </a:t>
+            </a:r>
+            <a:r>
+              <a:rPr lang="de-DE" dirty="0"/>
+              <a:t>müssen Englisch sein</a:t>
+            </a:r>
+          </a:p>
+          <a:p>
+            <a:r>
+              <a:rPr lang="de-DE" dirty="0"/>
+              <a:t>Jede </a:t>
+            </a:r>
+            <a:r>
+              <a:rPr lang="de-DE" b="1" dirty="0"/>
+              <a:t>Änderung</a:t>
+            </a:r>
+            <a:r>
+              <a:rPr lang="de-DE" dirty="0"/>
+              <a:t> soll ein </a:t>
+            </a:r>
+            <a:r>
+              <a:rPr lang="de-DE"/>
+              <a:t>Änderungskommentar besitzen</a:t>
+            </a:r>
+          </a:p>
+          <a:p>
+            <a:r>
+              <a:rPr lang="de-DE"/>
+              <a:t>Jede </a:t>
+            </a:r>
+            <a:r>
+              <a:rPr lang="de-DE" b="1" dirty="0"/>
+              <a:t>Funktion</a:t>
+            </a:r>
+            <a:r>
+              <a:rPr lang="de-DE" dirty="0"/>
+              <a:t> muss einen Kommentar besitzen</a:t>
+            </a:r>
+          </a:p>
+          <a:p>
+            <a:endParaRPr lang="de-DE" b="1" dirty="0"/>
           </a:p>
         </p:txBody>
       </p:sp>
     </p:spTree>
     <p:extLst>
       <p:ext uri="{BB962C8B-B14F-4D97-AF65-F5344CB8AC3E}">
-        <p14:creationId xmlns:p14="http://schemas.microsoft.com/office/powerpoint/2010/main" val="1456067933"/>
+        <p14:creationId xmlns:p14="http://schemas.microsoft.com/office/powerpoint/2010/main" val="3213749054"/>
       </p:ext>
     </p:extLst>
   </p:cSld>
@@ -3259,6 +3293,27 @@
             </a:r>
           </a:p>
           <a:p>
+            <a:r>
+              <a:rPr lang="de-DE" b="1" dirty="0"/>
+              <a:t>Konstanten</a:t>
+            </a:r>
+            <a:r>
+              <a:rPr lang="de-DE" dirty="0"/>
+              <a:t> müssen in Großbuchstaben deklariert werden</a:t>
+            </a:r>
+          </a:p>
+          <a:p>
+            <a:r>
+              <a:rPr lang="de-DE" dirty="0"/>
+              <a:t>Einrücken mit einem </a:t>
+            </a:r>
+            <a:r>
+              <a:rPr lang="de-DE" b="1" dirty="0"/>
+              <a:t>Tab</a:t>
+            </a:r>
+            <a:endParaRPr lang="de-DE" dirty="0"/>
+          </a:p>
+          <a:p>
             <a:endParaRPr lang="de-DE" b="1" dirty="0"/>
           </a:p>
         </p:txBody>
@@ -3266,7 +3321,7 @@
     </p:spTree>
     <p:extLst>
       <p:ext uri="{BB962C8B-B14F-4D97-AF65-F5344CB8AC3E}">
-        <p14:creationId xmlns:p14="http://schemas.microsoft.com/office/powerpoint/2010/main" val="3213749054"/>
+        <p14:creationId xmlns:p14="http://schemas.microsoft.com/office/powerpoint/2010/main" val="813890097"/>
       </p:ext>
     </p:extLst>
   </p:cSld>
@@ -3327,162 +3382,6 @@
         </p:nvSpPr>
         <p:spPr/>
         <p:txBody>
-          <a:bodyPr/>
-          <a:lstStyle/>
-          <a:p>
-            <a:r>
-              <a:rPr lang="de-DE" dirty="0"/>
-              <a:t>Jede Datei </a:t>
-            </a:r>
-            <a:r>
-              <a:rPr lang="de-DE" b="1" dirty="0"/>
-              <a:t>muss </a:t>
-            </a:r>
-            <a:r>
-              <a:rPr lang="de-DE" dirty="0"/>
-              <a:t>einen Kommentar welcher die Funktionalität beschreibt enthalten und Copyright verweise</a:t>
-            </a:r>
-          </a:p>
-          <a:p>
-            <a:r>
-              <a:rPr lang="de-DE" dirty="0"/>
-              <a:t>Die Sprache für </a:t>
-            </a:r>
-            <a:r>
-              <a:rPr lang="de-DE" b="1" dirty="0"/>
-              <a:t>Kommentare </a:t>
-            </a:r>
-            <a:r>
-              <a:rPr lang="de-DE" dirty="0"/>
-              <a:t>und </a:t>
-            </a:r>
-            <a:r>
-              <a:rPr lang="de-DE" b="1" dirty="0"/>
-              <a:t>Bezeichner </a:t>
-            </a:r>
-            <a:r>
-              <a:rPr lang="de-DE" dirty="0"/>
-              <a:t>müssen Englisch sein</a:t>
-            </a:r>
-          </a:p>
-          <a:p>
-            <a:r>
-              <a:rPr lang="de-DE" dirty="0"/>
-              <a:t>Jede </a:t>
-            </a:r>
-            <a:r>
-              <a:rPr lang="de-DE" b="1" dirty="0"/>
-              <a:t>Änderung</a:t>
-            </a:r>
-            <a:r>
-              <a:rPr lang="de-DE" dirty="0"/>
-              <a:t> soll ein Änderungskommentar besitzen und einen Zeitstempel</a:t>
-            </a:r>
-          </a:p>
-          <a:p>
-            <a:r>
-              <a:rPr lang="de-DE" dirty="0"/>
-              <a:t>Jede </a:t>
-            </a:r>
-            <a:r>
-              <a:rPr lang="de-DE" b="1" dirty="0"/>
-              <a:t>Funktion</a:t>
-            </a:r>
-            <a:r>
-              <a:rPr lang="de-DE" dirty="0"/>
-              <a:t> muss einen Kommentar besitzen</a:t>
-            </a:r>
-          </a:p>
-          <a:p>
-            <a:r>
-              <a:rPr lang="de-DE" b="1" dirty="0"/>
-              <a:t>Konstanten</a:t>
-            </a:r>
-            <a:r>
-              <a:rPr lang="de-DE" dirty="0"/>
-              <a:t> müssen in Großbuchstaben deklariert werden</a:t>
-            </a:r>
-          </a:p>
-          <a:p>
-            <a:r>
-              <a:rPr lang="de-DE" dirty="0"/>
-              <a:t>Einrücken mit einem </a:t>
-            </a:r>
-            <a:r>
-              <a:rPr lang="de-DE" b="1" dirty="0"/>
-              <a:t>Tab</a:t>
-            </a:r>
-            <a:endParaRPr lang="de-DE" dirty="0"/>
-          </a:p>
-          <a:p>
-            <a:endParaRPr lang="de-DE" b="1" dirty="0"/>
-          </a:p>
-        </p:txBody>
-      </p:sp>
-    </p:spTree>
-    <p:extLst>
-      <p:ext uri="{BB962C8B-B14F-4D97-AF65-F5344CB8AC3E}">
-        <p14:creationId xmlns:p14="http://schemas.microsoft.com/office/powerpoint/2010/main" val="813890097"/>
-      </p:ext>
-    </p:extLst>
-  </p:cSld>
-  <p:clrMapOvr>
-    <a:masterClrMapping/>
-  </p:clrMapOvr>
-</p:sld>
-</file>
-
-<file path=ppt/slides/slide5.xml><?xml version="1.0" encoding="utf-8"?>
-<p:sld xmlns:a="http://schemas.openxmlformats.org/drawingml/2006/main" xmlns:r="http://schemas.openxmlformats.org/officeDocument/2006/relationships" xmlns:p="http://schemas.openxmlformats.org/presentationml/2006/main">
-  <p:cSld>
-    <p:spTree>
-      <p:nvGrpSpPr>
-        <p:cNvPr id="1" name=""/>
-        <p:cNvGrpSpPr/>
-        <p:nvPr/>
-      </p:nvGrpSpPr>
-      <p:grpSpPr>
-        <a:xfrm>
-          <a:off x="0" y="0"/>
-          <a:ext cx="0" cy="0"/>
-          <a:chOff x="0" y="0"/>
-          <a:chExt cx="0" cy="0"/>
-        </a:xfrm>
-      </p:grpSpPr>
-      <p:sp>
-        <p:nvSpPr>
-          <p:cNvPr id="2" name="Titel 1"/>
-          <p:cNvSpPr>
-            <a:spLocks noGrp="1"/>
-          </p:cNvSpPr>
-          <p:nvPr>
-            <p:ph type="title"/>
-          </p:nvPr>
-        </p:nvSpPr>
-        <p:spPr/>
-        <p:txBody>
-          <a:bodyPr/>
-          <a:lstStyle/>
-          <a:p>
-            <a:r>
-              <a:rPr lang="de-DE" dirty="0"/>
-              <a:t>Entwicklungsrichtlinien „PHP“</a:t>
-            </a:r>
-          </a:p>
-        </p:txBody>
-      </p:sp>
-      <p:sp>
-        <p:nvSpPr>
-          <p:cNvPr id="3" name="Inhaltsplatzhalter 2"/>
-          <p:cNvSpPr>
-            <a:spLocks noGrp="1"/>
-          </p:cNvSpPr>
-          <p:nvPr>
-            <p:ph idx="1"/>
-          </p:nvPr>
-        </p:nvSpPr>
-        <p:spPr/>
-        <p:txBody>
           <a:bodyPr>
             <a:normAutofit fontScale="92500" lnSpcReduction="20000"/>
           </a:bodyPr>
@@ -3664,7 +3563,7 @@
 </p:sld>
 </file>
 
-<file path=ppt/slides/slide6.xml><?xml version="1.0" encoding="utf-8"?>
+<file path=ppt/slides/slide5.xml><?xml version="1.0" encoding="utf-8"?>
 <p:sld xmlns:a="http://schemas.openxmlformats.org/drawingml/2006/main" xmlns:r="http://schemas.openxmlformats.org/officeDocument/2006/relationships" xmlns:p="http://schemas.openxmlformats.org/presentationml/2006/main">
   <p:cSld>
     <p:spTree>

</xml_diff>